<commit_message>
Instrucciones para la instalación de matplotlib desde Thonny
</commit_message>
<xml_diff>
--- a/slides/python_elemental_slides.pptx
+++ b/slides/python_elemental_slides.pptx
@@ -5,10 +5,10 @@
     <p:sldMasterId id="2147483660" r:id="rId4"/>
   </p:sldMasterIdLst>
   <p:notesMasterIdLst>
-    <p:notesMasterId r:id="rId38"/>
+    <p:notesMasterId r:id="rId41"/>
   </p:notesMasterIdLst>
   <p:handoutMasterIdLst>
-    <p:handoutMasterId r:id="rId39"/>
+    <p:handoutMasterId r:id="rId42"/>
   </p:handoutMasterIdLst>
   <p:sldIdLst>
     <p:sldId id="256" r:id="rId5"/>
@@ -37,13 +37,16 @@
     <p:sldId id="305" r:id="rId28"/>
     <p:sldId id="290" r:id="rId29"/>
     <p:sldId id="291" r:id="rId30"/>
-    <p:sldId id="292" r:id="rId31"/>
-    <p:sldId id="299" r:id="rId32"/>
-    <p:sldId id="293" r:id="rId33"/>
-    <p:sldId id="294" r:id="rId34"/>
-    <p:sldId id="295" r:id="rId35"/>
-    <p:sldId id="296" r:id="rId36"/>
-    <p:sldId id="297" r:id="rId37"/>
+    <p:sldId id="306" r:id="rId31"/>
+    <p:sldId id="307" r:id="rId32"/>
+    <p:sldId id="308" r:id="rId33"/>
+    <p:sldId id="292" r:id="rId34"/>
+    <p:sldId id="299" r:id="rId35"/>
+    <p:sldId id="293" r:id="rId36"/>
+    <p:sldId id="294" r:id="rId37"/>
+    <p:sldId id="295" r:id="rId38"/>
+    <p:sldId id="296" r:id="rId39"/>
+    <p:sldId id="297" r:id="rId40"/>
   </p:sldIdLst>
   <p:sldSz cx="9144000" cy="5143500" type="screen16x9"/>
   <p:notesSz cx="6858000" cy="9144000"/>
@@ -2347,7 +2350,7 @@
     </p:spTree>
     <p:extLst>
       <p:ext uri="{BB962C8B-B14F-4D97-AF65-F5344CB8AC3E}">
-        <p14:creationId xmlns:p14="http://schemas.microsoft.com/office/powerpoint/2010/main" val="4099308197"/>
+        <p14:creationId xmlns:p14="http://schemas.microsoft.com/office/powerpoint/2010/main" val="3588757317"/>
       </p:ext>
     </p:extLst>
   </p:cSld>
@@ -2403,7 +2406,7 @@
           <a:p>
             <a:r>
               <a:rPr lang="es-ES" dirty="0"/>
-              <a:t>Imagen Joseph Fourier https://commons.wikimedia.org/wiki/File:Joseph_Fourier_(circa_1820).jpg</a:t>
+              <a:t>Imagen https://pxhere.com/en/photo/1192193 Dominio público</a:t>
             </a:r>
           </a:p>
         </p:txBody>
@@ -2434,7 +2437,7 @@
     </p:spTree>
     <p:extLst>
       <p:ext uri="{BB962C8B-B14F-4D97-AF65-F5344CB8AC3E}">
-        <p14:creationId xmlns:p14="http://schemas.microsoft.com/office/powerpoint/2010/main" val="507587488"/>
+        <p14:creationId xmlns:p14="http://schemas.microsoft.com/office/powerpoint/2010/main" val="2596499732"/>
       </p:ext>
     </p:extLst>
   </p:cSld>
@@ -2488,7 +2491,10 @@
           <a:bodyPr/>
           <a:lstStyle/>
           <a:p>
-            <a:endParaRPr lang="es-ES" dirty="0"/>
+            <a:r>
+              <a:rPr lang="es-ES" dirty="0"/>
+              <a:t>Imagen https://pxhere.com/en/photo/1192193 Dominio público</a:t>
+            </a:r>
           </a:p>
         </p:txBody>
       </p:sp>
@@ -2518,7 +2524,7 @@
     </p:spTree>
     <p:extLst>
       <p:ext uri="{BB962C8B-B14F-4D97-AF65-F5344CB8AC3E}">
-        <p14:creationId xmlns:p14="http://schemas.microsoft.com/office/powerpoint/2010/main" val="2722761063"/>
+        <p14:creationId xmlns:p14="http://schemas.microsoft.com/office/powerpoint/2010/main" val="1759477373"/>
       </p:ext>
     </p:extLst>
   </p:cSld>
@@ -2572,7 +2578,10 @@
           <a:bodyPr/>
           <a:lstStyle/>
           <a:p>
-            <a:endParaRPr lang="es-ES" dirty="0"/>
+            <a:r>
+              <a:rPr lang="es-ES" dirty="0"/>
+              <a:t>Imagen https://pxhere.com/en/photo/1192193 Dominio público</a:t>
+            </a:r>
           </a:p>
         </p:txBody>
       </p:sp>
@@ -2602,7 +2611,7 @@
     </p:spTree>
     <p:extLst>
       <p:ext uri="{BB962C8B-B14F-4D97-AF65-F5344CB8AC3E}">
-        <p14:creationId xmlns:p14="http://schemas.microsoft.com/office/powerpoint/2010/main" val="3967788565"/>
+        <p14:creationId xmlns:p14="http://schemas.microsoft.com/office/powerpoint/2010/main" val="4099308197"/>
       </p:ext>
     </p:extLst>
   </p:cSld>
@@ -2819,7 +2828,10 @@
           <a:bodyPr/>
           <a:lstStyle/>
           <a:p>
-            <a:endParaRPr lang="es-ES" dirty="0"/>
+            <a:r>
+              <a:rPr lang="es-ES" dirty="0"/>
+              <a:t>Imagen Joseph Fourier https://commons.wikimedia.org/wiki/File:Joseph_Fourier_(circa_1820).jpg</a:t>
+            </a:r>
           </a:p>
         </p:txBody>
       </p:sp>
@@ -2849,7 +2861,7 @@
     </p:spTree>
     <p:extLst>
       <p:ext uri="{BB962C8B-B14F-4D97-AF65-F5344CB8AC3E}">
-        <p14:creationId xmlns:p14="http://schemas.microsoft.com/office/powerpoint/2010/main" val="556649249"/>
+        <p14:creationId xmlns:p14="http://schemas.microsoft.com/office/powerpoint/2010/main" val="507587488"/>
       </p:ext>
     </p:extLst>
   </p:cSld>
@@ -2933,7 +2945,7 @@
     </p:spTree>
     <p:extLst>
       <p:ext uri="{BB962C8B-B14F-4D97-AF65-F5344CB8AC3E}">
-        <p14:creationId xmlns:p14="http://schemas.microsoft.com/office/powerpoint/2010/main" val="107422639"/>
+        <p14:creationId xmlns:p14="http://schemas.microsoft.com/office/powerpoint/2010/main" val="2722761063"/>
       </p:ext>
     </p:extLst>
   </p:cSld>
@@ -3009,6 +3021,258 @@
             <a:fld id="{2626A500-1DA6-4541-BE61-DEBA7B330470}" type="slidenum">
               <a:rPr lang="es-ES" smtClean="0"/>
               <a:t>33</a:t>
+            </a:fld>
+            <a:endParaRPr lang="es-ES"/>
+          </a:p>
+        </p:txBody>
+      </p:sp>
+    </p:spTree>
+    <p:extLst>
+      <p:ext uri="{BB962C8B-B14F-4D97-AF65-F5344CB8AC3E}">
+        <p14:creationId xmlns:p14="http://schemas.microsoft.com/office/powerpoint/2010/main" val="3967788565"/>
+      </p:ext>
+    </p:extLst>
+  </p:cSld>
+  <p:clrMapOvr>
+    <a:masterClrMapping/>
+  </p:clrMapOvr>
+</p:notes>
+</file>
+
+<file path=ppt/notesSlides/notesSlide33.xml><?xml version="1.0" encoding="utf-8"?>
+<p:notes xmlns:a="http://schemas.openxmlformats.org/drawingml/2006/main" xmlns:r="http://schemas.openxmlformats.org/officeDocument/2006/relationships" xmlns:p="http://schemas.openxmlformats.org/presentationml/2006/main">
+  <p:cSld>
+    <p:spTree>
+      <p:nvGrpSpPr>
+        <p:cNvPr id="1" name=""/>
+        <p:cNvGrpSpPr/>
+        <p:nvPr/>
+      </p:nvGrpSpPr>
+      <p:grpSpPr>
+        <a:xfrm>
+          <a:off x="0" y="0"/>
+          <a:ext cx="0" cy="0"/>
+          <a:chOff x="0" y="0"/>
+          <a:chExt cx="0" cy="0"/>
+        </a:xfrm>
+      </p:grpSpPr>
+      <p:sp>
+        <p:nvSpPr>
+          <p:cNvPr id="2" name="Marcador de imagen de diapositiva 1"/>
+          <p:cNvSpPr>
+            <a:spLocks noGrp="1" noRot="1" noChangeAspect="1"/>
+          </p:cNvSpPr>
+          <p:nvPr>
+            <p:ph type="sldImg"/>
+          </p:nvPr>
+        </p:nvSpPr>
+        <p:spPr/>
+      </p:sp>
+      <p:sp>
+        <p:nvSpPr>
+          <p:cNvPr id="3" name="Marcador de notas 2"/>
+          <p:cNvSpPr>
+            <a:spLocks noGrp="1"/>
+          </p:cNvSpPr>
+          <p:nvPr>
+            <p:ph type="body" idx="1"/>
+          </p:nvPr>
+        </p:nvSpPr>
+        <p:spPr/>
+        <p:txBody>
+          <a:bodyPr/>
+          <a:lstStyle/>
+          <a:p>
+            <a:endParaRPr lang="es-ES" dirty="0"/>
+          </a:p>
+        </p:txBody>
+      </p:sp>
+      <p:sp>
+        <p:nvSpPr>
+          <p:cNvPr id="4" name="Marcador de número de diapositiva 3"/>
+          <p:cNvSpPr>
+            <a:spLocks noGrp="1"/>
+          </p:cNvSpPr>
+          <p:nvPr>
+            <p:ph type="sldNum" sz="quarter" idx="10"/>
+          </p:nvPr>
+        </p:nvSpPr>
+        <p:spPr/>
+        <p:txBody>
+          <a:bodyPr/>
+          <a:lstStyle/>
+          <a:p>
+            <a:fld id="{2626A500-1DA6-4541-BE61-DEBA7B330470}" type="slidenum">
+              <a:rPr lang="es-ES" smtClean="0"/>
+              <a:t>34</a:t>
+            </a:fld>
+            <a:endParaRPr lang="es-ES"/>
+          </a:p>
+        </p:txBody>
+      </p:sp>
+    </p:spTree>
+    <p:extLst>
+      <p:ext uri="{BB962C8B-B14F-4D97-AF65-F5344CB8AC3E}">
+        <p14:creationId xmlns:p14="http://schemas.microsoft.com/office/powerpoint/2010/main" val="556649249"/>
+      </p:ext>
+    </p:extLst>
+  </p:cSld>
+  <p:clrMapOvr>
+    <a:masterClrMapping/>
+  </p:clrMapOvr>
+</p:notes>
+</file>
+
+<file path=ppt/notesSlides/notesSlide34.xml><?xml version="1.0" encoding="utf-8"?>
+<p:notes xmlns:a="http://schemas.openxmlformats.org/drawingml/2006/main" xmlns:r="http://schemas.openxmlformats.org/officeDocument/2006/relationships" xmlns:p="http://schemas.openxmlformats.org/presentationml/2006/main">
+  <p:cSld>
+    <p:spTree>
+      <p:nvGrpSpPr>
+        <p:cNvPr id="1" name=""/>
+        <p:cNvGrpSpPr/>
+        <p:nvPr/>
+      </p:nvGrpSpPr>
+      <p:grpSpPr>
+        <a:xfrm>
+          <a:off x="0" y="0"/>
+          <a:ext cx="0" cy="0"/>
+          <a:chOff x="0" y="0"/>
+          <a:chExt cx="0" cy="0"/>
+        </a:xfrm>
+      </p:grpSpPr>
+      <p:sp>
+        <p:nvSpPr>
+          <p:cNvPr id="2" name="Marcador de imagen de diapositiva 1"/>
+          <p:cNvSpPr>
+            <a:spLocks noGrp="1" noRot="1" noChangeAspect="1"/>
+          </p:cNvSpPr>
+          <p:nvPr>
+            <p:ph type="sldImg"/>
+          </p:nvPr>
+        </p:nvSpPr>
+        <p:spPr/>
+      </p:sp>
+      <p:sp>
+        <p:nvSpPr>
+          <p:cNvPr id="3" name="Marcador de notas 2"/>
+          <p:cNvSpPr>
+            <a:spLocks noGrp="1"/>
+          </p:cNvSpPr>
+          <p:nvPr>
+            <p:ph type="body" idx="1"/>
+          </p:nvPr>
+        </p:nvSpPr>
+        <p:spPr/>
+        <p:txBody>
+          <a:bodyPr/>
+          <a:lstStyle/>
+          <a:p>
+            <a:endParaRPr lang="es-ES" dirty="0"/>
+          </a:p>
+        </p:txBody>
+      </p:sp>
+      <p:sp>
+        <p:nvSpPr>
+          <p:cNvPr id="4" name="Marcador de número de diapositiva 3"/>
+          <p:cNvSpPr>
+            <a:spLocks noGrp="1"/>
+          </p:cNvSpPr>
+          <p:nvPr>
+            <p:ph type="sldNum" sz="quarter" idx="10"/>
+          </p:nvPr>
+        </p:nvSpPr>
+        <p:spPr/>
+        <p:txBody>
+          <a:bodyPr/>
+          <a:lstStyle/>
+          <a:p>
+            <a:fld id="{2626A500-1DA6-4541-BE61-DEBA7B330470}" type="slidenum">
+              <a:rPr lang="es-ES" smtClean="0"/>
+              <a:t>35</a:t>
+            </a:fld>
+            <a:endParaRPr lang="es-ES"/>
+          </a:p>
+        </p:txBody>
+      </p:sp>
+    </p:spTree>
+    <p:extLst>
+      <p:ext uri="{BB962C8B-B14F-4D97-AF65-F5344CB8AC3E}">
+        <p14:creationId xmlns:p14="http://schemas.microsoft.com/office/powerpoint/2010/main" val="107422639"/>
+      </p:ext>
+    </p:extLst>
+  </p:cSld>
+  <p:clrMapOvr>
+    <a:masterClrMapping/>
+  </p:clrMapOvr>
+</p:notes>
+</file>
+
+<file path=ppt/notesSlides/notesSlide35.xml><?xml version="1.0" encoding="utf-8"?>
+<p:notes xmlns:a="http://schemas.openxmlformats.org/drawingml/2006/main" xmlns:r="http://schemas.openxmlformats.org/officeDocument/2006/relationships" xmlns:p="http://schemas.openxmlformats.org/presentationml/2006/main">
+  <p:cSld>
+    <p:spTree>
+      <p:nvGrpSpPr>
+        <p:cNvPr id="1" name=""/>
+        <p:cNvGrpSpPr/>
+        <p:nvPr/>
+      </p:nvGrpSpPr>
+      <p:grpSpPr>
+        <a:xfrm>
+          <a:off x="0" y="0"/>
+          <a:ext cx="0" cy="0"/>
+          <a:chOff x="0" y="0"/>
+          <a:chExt cx="0" cy="0"/>
+        </a:xfrm>
+      </p:grpSpPr>
+      <p:sp>
+        <p:nvSpPr>
+          <p:cNvPr id="2" name="Marcador de imagen de diapositiva 1"/>
+          <p:cNvSpPr>
+            <a:spLocks noGrp="1" noRot="1" noChangeAspect="1"/>
+          </p:cNvSpPr>
+          <p:nvPr>
+            <p:ph type="sldImg"/>
+          </p:nvPr>
+        </p:nvSpPr>
+        <p:spPr/>
+      </p:sp>
+      <p:sp>
+        <p:nvSpPr>
+          <p:cNvPr id="3" name="Marcador de notas 2"/>
+          <p:cNvSpPr>
+            <a:spLocks noGrp="1"/>
+          </p:cNvSpPr>
+          <p:nvPr>
+            <p:ph type="body" idx="1"/>
+          </p:nvPr>
+        </p:nvSpPr>
+        <p:spPr/>
+        <p:txBody>
+          <a:bodyPr/>
+          <a:lstStyle/>
+          <a:p>
+            <a:endParaRPr lang="es-ES" dirty="0"/>
+          </a:p>
+        </p:txBody>
+      </p:sp>
+      <p:sp>
+        <p:nvSpPr>
+          <p:cNvPr id="4" name="Marcador de número de diapositiva 3"/>
+          <p:cNvSpPr>
+            <a:spLocks noGrp="1"/>
+          </p:cNvSpPr>
+          <p:nvPr>
+            <p:ph type="sldNum" sz="quarter" idx="10"/>
+          </p:nvPr>
+        </p:nvSpPr>
+        <p:spPr/>
+        <p:txBody>
+          <a:bodyPr/>
+          <a:lstStyle/>
+          <a:p>
+            <a:fld id="{2626A500-1DA6-4541-BE61-DEBA7B330470}" type="slidenum">
+              <a:rPr lang="es-ES" smtClean="0"/>
+              <a:t>36</a:t>
             </a:fld>
             <a:endParaRPr lang="es-ES"/>
           </a:p>
@@ -10456,8 +10720,8 @@
         </p:nvSpPr>
         <p:spPr>
           <a:xfrm>
-            <a:off x="1304637" y="1599642"/>
-            <a:ext cx="2662929" cy="1277273"/>
+            <a:off x="1573212" y="1292549"/>
+            <a:ext cx="7327299" cy="646331"/>
           </a:xfrm>
           <a:prstGeom prst="rect">
             <a:avLst/>
@@ -10472,78 +10736,38 @@
           <a:p>
             <a:pPr algn="just"/>
             <a:r>
-              <a:rPr lang="es-ES" sz="1100" dirty="0"/>
+              <a:rPr lang="es-ES" sz="1200" dirty="0"/>
               <a:t>Python dispone de distintos tipos de gráficos. El paquete </a:t>
             </a:r>
             <a:r>
-              <a:rPr lang="es-ES" sz="1100" dirty="0" err="1"/>
+              <a:rPr lang="es-ES" sz="1200" dirty="0" err="1"/>
               <a:t>matplotlib</a:t>
             </a:r>
             <a:r>
-              <a:rPr lang="es-ES" sz="1100" dirty="0"/>
-              <a:t> permite generar gráficas estáticas.</a:t>
+              <a:rPr lang="es-ES" sz="1200" dirty="0"/>
+              <a:t> permite generar gráficas estáticas. Este paquete no se descarga con la distribución estándar de </a:t>
+            </a:r>
+            <a:r>
+              <a:rPr lang="es-ES" sz="1200" dirty="0" err="1"/>
+              <a:t>Thonny</a:t>
+            </a:r>
+            <a:r>
+              <a:rPr lang="es-ES" sz="1200" dirty="0"/>
+              <a:t>. Obtendrás el siguiente mensaje de error</a:t>
             </a:r>
           </a:p>
           <a:p>
             <a:pPr algn="just"/>
-            <a:endParaRPr lang="es-ES" sz="1100" dirty="0"/>
-          </a:p>
-          <a:p>
-            <a:pPr algn="just"/>
-            <a:r>
-              <a:rPr lang="es-ES" sz="1100" dirty="0"/>
-              <a:t> ¿Recuerdas  las fórmulas de la recta, la parábola o la circunferencia que viste en matemáticas?</a:t>
-            </a:r>
-          </a:p>
-        </p:txBody>
-      </p:sp>
-      <p:sp>
-        <p:nvSpPr>
-          <p:cNvPr id="10" name="Rectángulo 9">
-            <a:extLst>
-              <a:ext uri="{FF2B5EF4-FFF2-40B4-BE49-F238E27FC236}">
-                <a16:creationId xmlns:a16="http://schemas.microsoft.com/office/drawing/2014/main" id="{6B1CDEA1-CC90-40DE-99A0-727A817C58CD}"/>
-              </a:ext>
-            </a:extLst>
-          </p:cNvPr>
-          <p:cNvSpPr/>
-          <p:nvPr/>
-        </p:nvSpPr>
-        <p:spPr>
-          <a:xfrm>
-            <a:off x="3101715" y="4734312"/>
-            <a:ext cx="2119491" cy="248209"/>
-          </a:xfrm>
-          <a:prstGeom prst="rect">
-            <a:avLst/>
-          </a:prstGeom>
-        </p:spPr>
-        <p:txBody>
-          <a:bodyPr wrap="none">
-            <a:spAutoFit/>
-          </a:bodyPr>
-          <a:lstStyle/>
-          <a:p>
-            <a:r>
-              <a:rPr lang="es-ES" sz="1013" dirty="0"/>
-              <a:t>Abre los ficheros </a:t>
-            </a:r>
-            <a:r>
-              <a:rPr lang="es-ES" sz="1013" dirty="0">
-                <a:latin typeface="Lucida Console" panose="020B0609040504020204" pitchFamily="49" charset="0"/>
-              </a:rPr>
-              <a:t>pinta_.....py</a:t>
-            </a:r>
-            <a:endParaRPr lang="es-ES" sz="1013" dirty="0"/>
+            <a:endParaRPr lang="es-ES" sz="1200" dirty="0"/>
           </a:p>
         </p:txBody>
       </p:sp>
       <p:pic>
         <p:nvPicPr>
-          <p:cNvPr id="2" name="Imagen 1">
-            <a:extLst>
-              <a:ext uri="{FF2B5EF4-FFF2-40B4-BE49-F238E27FC236}">
-                <a16:creationId xmlns:a16="http://schemas.microsoft.com/office/drawing/2014/main" id="{4B7514D5-E3D3-4236-B4E5-D0D578F341A2}"/>
+          <p:cNvPr id="6" name="Imagen 5">
+            <a:extLst>
+              <a:ext uri="{FF2B5EF4-FFF2-40B4-BE49-F238E27FC236}">
+                <a16:creationId xmlns:a16="http://schemas.microsoft.com/office/drawing/2014/main" id="{17F50F3E-8837-0787-A6D7-EC4DD26A0E19}"/>
               </a:ext>
             </a:extLst>
           </p:cNvPr>
@@ -10560,8 +10784,8 @@
         </p:blipFill>
         <p:spPr>
           <a:xfrm>
-            <a:off x="4518323" y="1475538"/>
-            <a:ext cx="3754151" cy="2798880"/>
+            <a:off x="2821428" y="2187785"/>
+            <a:ext cx="5088132" cy="1751235"/>
           </a:xfrm>
           <a:prstGeom prst="rect">
             <a:avLst/>
@@ -10571,7 +10795,7 @@
     </p:spTree>
     <p:extLst>
       <p:ext uri="{BB962C8B-B14F-4D97-AF65-F5344CB8AC3E}">
-        <p14:creationId xmlns:p14="http://schemas.microsoft.com/office/powerpoint/2010/main" val="1688115370"/>
+        <p14:creationId xmlns:p14="http://schemas.microsoft.com/office/powerpoint/2010/main" val="2708719547"/>
       </p:ext>
     </p:extLst>
   </p:cSld>
@@ -10616,7 +10840,7 @@
         </p:nvSpPr>
         <p:spPr>
           <a:xfrm>
-            <a:off x="1344612" y="414680"/>
+            <a:off x="1344612" y="474308"/>
             <a:ext cx="6454775" cy="541337"/>
           </a:xfrm>
         </p:spPr>
@@ -10633,51 +10857,10 @@
       </p:sp>
       <p:sp>
         <p:nvSpPr>
-          <p:cNvPr id="10" name="Rectángulo 9">
-            <a:extLst>
-              <a:ext uri="{FF2B5EF4-FFF2-40B4-BE49-F238E27FC236}">
-                <a16:creationId xmlns:a16="http://schemas.microsoft.com/office/drawing/2014/main" id="{6B1CDEA1-CC90-40DE-99A0-727A817C58CD}"/>
-              </a:ext>
-            </a:extLst>
-          </p:cNvPr>
-          <p:cNvSpPr/>
-          <p:nvPr/>
-        </p:nvSpPr>
-        <p:spPr>
-          <a:xfrm>
-            <a:off x="2861766" y="4785996"/>
-            <a:ext cx="2141933" cy="248209"/>
-          </a:xfrm>
-          <a:prstGeom prst="rect">
-            <a:avLst/>
-          </a:prstGeom>
-        </p:spPr>
-        <p:txBody>
-          <a:bodyPr wrap="none">
-            <a:spAutoFit/>
-          </a:bodyPr>
-          <a:lstStyle/>
-          <a:p>
-            <a:r>
-              <a:rPr lang="es-ES" sz="1013" dirty="0"/>
-              <a:t>Abre el ficheros </a:t>
-            </a:r>
-            <a:r>
-              <a:rPr lang="es-ES" sz="1013" dirty="0">
-                <a:latin typeface="Lucida Console" panose="020B0609040504020204" pitchFamily="49" charset="0"/>
-              </a:rPr>
-              <a:t>onda_magica.py</a:t>
-            </a:r>
-            <a:endParaRPr lang="es-ES" sz="1013" dirty="0"/>
-          </a:p>
-        </p:txBody>
-      </p:sp>
-      <p:sp>
-        <p:nvSpPr>
-          <p:cNvPr id="6" name="CuadroTexto 5">
-            <a:extLst>
-              <a:ext uri="{FF2B5EF4-FFF2-40B4-BE49-F238E27FC236}">
-                <a16:creationId xmlns:a16="http://schemas.microsoft.com/office/drawing/2014/main" id="{FEF2BB80-0981-414A-95A8-32C9236895B9}"/>
+          <p:cNvPr id="5" name="CuadroTexto 4">
+            <a:extLst>
+              <a:ext uri="{FF2B5EF4-FFF2-40B4-BE49-F238E27FC236}">
+                <a16:creationId xmlns:a16="http://schemas.microsoft.com/office/drawing/2014/main" id="{B93E3719-8EF1-43EA-8219-974FD6AF3B75}"/>
               </a:ext>
             </a:extLst>
           </p:cNvPr>
@@ -10686,8 +10869,8 @@
         </p:nvSpPr>
         <p:spPr>
           <a:xfrm>
-            <a:off x="1331641" y="1761660"/>
-            <a:ext cx="5138902" cy="830997"/>
+            <a:off x="1344612" y="1431320"/>
+            <a:ext cx="7327299" cy="1200329"/>
           </a:xfrm>
           <a:prstGeom prst="rect">
             <a:avLst/>
@@ -10703,25 +10886,61 @@
             <a:pPr algn="just"/>
             <a:r>
               <a:rPr lang="es-ES" sz="1200" dirty="0"/>
-              <a:t>Un matemático francés del siglo XIX descubrió que cualquier forma de onda puede conseguirse sumando funciones </a:t>
+              <a:t>Para solucionarlo, lo instalaremos,</a:t>
+            </a:r>
+          </a:p>
+          <a:p>
+            <a:pPr algn="just"/>
+            <a:r>
+              <a:rPr lang="es-ES" sz="1200" dirty="0"/>
+              <a:t>desde la opción principal del menú</a:t>
+            </a:r>
+          </a:p>
+          <a:p>
+            <a:pPr algn="just"/>
+            <a:r>
+              <a:rPr lang="es-ES" sz="1200" dirty="0"/>
+              <a:t>Herramientas, Gestionar Paquetes.</a:t>
+            </a:r>
+          </a:p>
+          <a:p>
+            <a:pPr algn="just"/>
+            <a:r>
+              <a:rPr lang="es-ES" sz="1200" dirty="0"/>
+              <a:t>Escribimos </a:t>
             </a:r>
             <a:r>
               <a:rPr lang="es-ES" sz="1200" dirty="0" err="1"/>
-              <a:t>sen</a:t>
+              <a:t>matplotlib</a:t>
             </a:r>
             <a:r>
               <a:rPr lang="es-ES" sz="1200" dirty="0"/>
-              <a:t>(x). Esto te puede parecer extraño e incluso aburrido, pero es la base del funcionamiento de los ficheros de audio y video digitales. Vamos a comprobar si es cierto…</a:t>
-            </a:r>
+              <a:t> y buscamos en</a:t>
+            </a:r>
+          </a:p>
+          <a:p>
+            <a:pPr algn="just"/>
+            <a:r>
+              <a:rPr lang="es-ES" sz="1200" dirty="0" err="1"/>
+              <a:t>PyPi</a:t>
+            </a:r>
+            <a:r>
+              <a:rPr lang="es-ES" sz="1200" dirty="0"/>
+              <a:t> </a:t>
+            </a:r>
+          </a:p>
+          <a:p>
+            <a:pPr algn="just"/>
+            <a:endParaRPr lang="es-ES" sz="1200" dirty="0"/>
           </a:p>
         </p:txBody>
       </p:sp>
       <p:pic>
         <p:nvPicPr>
-          <p:cNvPr id="8" name="Imagen 7">
-            <a:extLst>
-              <a:ext uri="{FF2B5EF4-FFF2-40B4-BE49-F238E27FC236}">
-                <a16:creationId xmlns:a16="http://schemas.microsoft.com/office/drawing/2014/main" id="{91582500-B07C-4697-A3BB-9CC228465D85}"/>
+          <p:cNvPr id="3" name="Imagen 2">
+            <a:extLst>
+              <a:ext uri="{FF2B5EF4-FFF2-40B4-BE49-F238E27FC236}">
+                <a16:creationId xmlns:a16="http://schemas.microsoft.com/office/drawing/2014/main" id="{32088732-A161-3F13-FA00-03F56B7B31EF}"/>
               </a:ext>
             </a:extLst>
           </p:cNvPr>
@@ -10731,31 +10950,15 @@
           <p:nvPr/>
         </p:nvPicPr>
         <p:blipFill>
-          <a:blip r:embed="rId3">
-            <a:clrChange>
-              <a:clrFrom>
-                <a:srgbClr val="FFFFFF"/>
-              </a:clrFrom>
-              <a:clrTo>
-                <a:srgbClr val="FFFFFF">
-                  <a:alpha val="0"/>
-                </a:srgbClr>
-              </a:clrTo>
-            </a:clrChange>
-            <a:extLst>
-              <a:ext uri="{28A0092B-C50C-407E-A947-70E740481C1C}">
-                <a14:useLocalDpi xmlns:a14="http://schemas.microsoft.com/office/drawing/2010/main" val="0"/>
-              </a:ext>
-            </a:extLst>
-          </a:blip>
+          <a:blip r:embed="rId3"/>
           <a:stretch>
             <a:fillRect/>
           </a:stretch>
         </p:blipFill>
         <p:spPr>
           <a:xfrm>
-            <a:off x="6613853" y="1694173"/>
-            <a:ext cx="1885950" cy="2128838"/>
+            <a:off x="4087368" y="1293842"/>
+            <a:ext cx="4895186" cy="3584053"/>
           </a:xfrm>
           <a:prstGeom prst="rect">
             <a:avLst/>
@@ -10764,43 +10967,112 @@
       </p:pic>
       <p:sp>
         <p:nvSpPr>
-          <p:cNvPr id="9" name="CuadroTexto 8">
-            <a:extLst>
-              <a:ext uri="{FF2B5EF4-FFF2-40B4-BE49-F238E27FC236}">
-                <a16:creationId xmlns:a16="http://schemas.microsoft.com/office/drawing/2014/main" id="{8F524D98-CDD0-4262-A75F-88EAE5CC4A80}"/>
-              </a:ext>
-            </a:extLst>
-          </p:cNvPr>
-          <p:cNvSpPr txBox="1"/>
+          <p:cNvPr id="7" name="Rectángulo 6">
+            <a:extLst>
+              <a:ext uri="{FF2B5EF4-FFF2-40B4-BE49-F238E27FC236}">
+                <a16:creationId xmlns:a16="http://schemas.microsoft.com/office/drawing/2014/main" id="{07D6F095-110D-A440-B5C3-EA784E68779E}"/>
+              </a:ext>
+            </a:extLst>
+          </p:cNvPr>
+          <p:cNvSpPr/>
           <p:nvPr/>
         </p:nvSpPr>
         <p:spPr>
           <a:xfrm>
-            <a:off x="6613853" y="4122664"/>
-            <a:ext cx="1633781" cy="248209"/>
+            <a:off x="4507992" y="1956816"/>
+            <a:ext cx="722376" cy="210312"/>
           </a:xfrm>
           <a:prstGeom prst="rect">
             <a:avLst/>
           </a:prstGeom>
           <a:noFill/>
-        </p:spPr>
-        <p:txBody>
-          <a:bodyPr wrap="none" rtlCol="0">
-            <a:spAutoFit/>
-          </a:bodyPr>
-          <a:lstStyle/>
-          <a:p>
-            <a:r>
-              <a:rPr lang="es-ES" sz="1013" dirty="0"/>
-              <a:t>Joseph Fourier (1768-1830)</a:t>
-            </a:r>
+          <a:ln>
+            <a:solidFill>
+              <a:srgbClr val="FF0000"/>
+            </a:solidFill>
+          </a:ln>
+        </p:spPr>
+        <p:style>
+          <a:lnRef idx="2">
+            <a:schemeClr val="accent1">
+              <a:shade val="15000"/>
+            </a:schemeClr>
+          </a:lnRef>
+          <a:fillRef idx="1">
+            <a:schemeClr val="accent1"/>
+          </a:fillRef>
+          <a:effectRef idx="0">
+            <a:schemeClr val="accent1"/>
+          </a:effectRef>
+          <a:fontRef idx="minor">
+            <a:schemeClr val="lt1"/>
+          </a:fontRef>
+        </p:style>
+        <p:txBody>
+          <a:bodyPr rtlCol="0" anchor="ctr"/>
+          <a:lstStyle/>
+          <a:p>
+            <a:pPr algn="ctr"/>
+            <a:endParaRPr lang="en-US"/>
+          </a:p>
+        </p:txBody>
+      </p:sp>
+      <p:sp>
+        <p:nvSpPr>
+          <p:cNvPr id="8" name="Rectángulo 7">
+            <a:extLst>
+              <a:ext uri="{FF2B5EF4-FFF2-40B4-BE49-F238E27FC236}">
+                <a16:creationId xmlns:a16="http://schemas.microsoft.com/office/drawing/2014/main" id="{7359421D-36E9-1B2B-BC1D-C172593C0CFE}"/>
+              </a:ext>
+            </a:extLst>
+          </p:cNvPr>
+          <p:cNvSpPr/>
+          <p:nvPr/>
+        </p:nvSpPr>
+        <p:spPr>
+          <a:xfrm>
+            <a:off x="5486400" y="1431320"/>
+            <a:ext cx="557784" cy="242032"/>
+          </a:xfrm>
+          <a:prstGeom prst="rect">
+            <a:avLst/>
+          </a:prstGeom>
+          <a:noFill/>
+          <a:ln>
+            <a:solidFill>
+              <a:srgbClr val="FF0000"/>
+            </a:solidFill>
+          </a:ln>
+        </p:spPr>
+        <p:style>
+          <a:lnRef idx="2">
+            <a:schemeClr val="accent1">
+              <a:shade val="15000"/>
+            </a:schemeClr>
+          </a:lnRef>
+          <a:fillRef idx="1">
+            <a:schemeClr val="accent1"/>
+          </a:fillRef>
+          <a:effectRef idx="0">
+            <a:schemeClr val="accent1"/>
+          </a:effectRef>
+          <a:fontRef idx="minor">
+            <a:schemeClr val="lt1"/>
+          </a:fontRef>
+        </p:style>
+        <p:txBody>
+          <a:bodyPr rtlCol="0" anchor="ctr"/>
+          <a:lstStyle/>
+          <a:p>
+            <a:pPr algn="ctr"/>
+            <a:endParaRPr lang="en-US"/>
           </a:p>
         </p:txBody>
       </p:sp>
     </p:spTree>
     <p:extLst>
       <p:ext uri="{BB962C8B-B14F-4D97-AF65-F5344CB8AC3E}">
-        <p14:creationId xmlns:p14="http://schemas.microsoft.com/office/powerpoint/2010/main" val="4238457856"/>
+        <p14:creationId xmlns:p14="http://schemas.microsoft.com/office/powerpoint/2010/main" val="2904583058"/>
       </p:ext>
     </p:extLst>
   </p:cSld>
@@ -10845,7 +11117,7 @@
         </p:nvSpPr>
         <p:spPr>
           <a:xfrm>
-            <a:off x="1344612" y="305391"/>
+            <a:off x="1344612" y="474308"/>
             <a:ext cx="6454775" cy="541337"/>
           </a:xfrm>
         </p:spPr>
@@ -10855,104 +11127,8 @@
           <a:p>
             <a:r>
               <a:rPr lang="es-ES" dirty="0"/>
-              <a:t>Animación</a:t>
-            </a:r>
-          </a:p>
-        </p:txBody>
-      </p:sp>
-      <p:sp>
-        <p:nvSpPr>
-          <p:cNvPr id="5" name="CuadroTexto 4">
-            <a:extLst>
-              <a:ext uri="{FF2B5EF4-FFF2-40B4-BE49-F238E27FC236}">
-                <a16:creationId xmlns:a16="http://schemas.microsoft.com/office/drawing/2014/main" id="{B93E3719-8EF1-43EA-8219-974FD6AF3B75}"/>
-              </a:ext>
-            </a:extLst>
-          </p:cNvPr>
-          <p:cNvSpPr txBox="1"/>
-          <p:nvPr/>
-        </p:nvSpPr>
-        <p:spPr>
-          <a:xfrm>
-            <a:off x="1950862" y="1492250"/>
-            <a:ext cx="2835315" cy="1200329"/>
-          </a:xfrm>
-          <a:prstGeom prst="rect">
-            <a:avLst/>
-          </a:prstGeom>
-          <a:noFill/>
-        </p:spPr>
-        <p:txBody>
-          <a:bodyPr wrap="square" rtlCol="0">
-            <a:spAutoFit/>
-          </a:bodyPr>
-          <a:lstStyle/>
-          <a:p>
-            <a:pPr algn="just"/>
-            <a:r>
-              <a:rPr lang="es-ES" sz="1200" dirty="0"/>
-              <a:t>Los gráficos estáticos son interesantes pero, ¡resultan mucho más divertidos los animados!.</a:t>
-            </a:r>
-          </a:p>
-          <a:p>
-            <a:pPr algn="just"/>
-            <a:endParaRPr lang="es-ES" sz="1200" dirty="0"/>
-          </a:p>
-          <a:p>
-            <a:pPr algn="just"/>
-            <a:r>
-              <a:rPr lang="es-ES" sz="1200" dirty="0"/>
-              <a:t>Eso lo podemos conseguir con las funciones de animación de </a:t>
-            </a:r>
-            <a:r>
-              <a:rPr lang="es-ES" sz="1200" dirty="0" err="1"/>
-              <a:t>matplotlib</a:t>
-            </a:r>
-            <a:r>
-              <a:rPr lang="es-ES" sz="1200" dirty="0"/>
-              <a:t>.</a:t>
-            </a:r>
-          </a:p>
-        </p:txBody>
-      </p:sp>
-      <p:sp>
-        <p:nvSpPr>
-          <p:cNvPr id="10" name="Rectángulo 9">
-            <a:extLst>
-              <a:ext uri="{FF2B5EF4-FFF2-40B4-BE49-F238E27FC236}">
-                <a16:creationId xmlns:a16="http://schemas.microsoft.com/office/drawing/2014/main" id="{6B1CDEA1-CC90-40DE-99A0-727A817C58CD}"/>
-              </a:ext>
-            </a:extLst>
-          </p:cNvPr>
-          <p:cNvSpPr/>
-          <p:nvPr/>
-        </p:nvSpPr>
-        <p:spPr>
-          <a:xfrm>
-            <a:off x="2858222" y="3784558"/>
-            <a:ext cx="1409360" cy="248209"/>
-          </a:xfrm>
-          <a:prstGeom prst="rect">
-            <a:avLst/>
-          </a:prstGeom>
-        </p:spPr>
-        <p:txBody>
-          <a:bodyPr wrap="none">
-            <a:spAutoFit/>
-          </a:bodyPr>
-          <a:lstStyle/>
-          <a:p>
-            <a:r>
-              <a:rPr lang="es-ES" sz="1013" dirty="0"/>
-              <a:t>Abre </a:t>
-            </a:r>
-            <a:r>
-              <a:rPr lang="es-ES" sz="1013" dirty="0">
-                <a:latin typeface="Lucida Console" panose="020B0609040504020204" pitchFamily="49" charset="0"/>
-              </a:rPr>
-              <a:t>animacion.py</a:t>
-            </a:r>
-            <a:endParaRPr lang="es-ES" sz="1013" dirty="0"/>
+              <a:t>Gráficos</a:t>
+            </a:r>
           </a:p>
         </p:txBody>
       </p:sp>
@@ -10961,7 +11137,7 @@
           <p:cNvPr id="6" name="Imagen 5">
             <a:extLst>
               <a:ext uri="{FF2B5EF4-FFF2-40B4-BE49-F238E27FC236}">
-                <a16:creationId xmlns:a16="http://schemas.microsoft.com/office/drawing/2014/main" id="{9BF54C30-1690-40A2-AA8B-BA1E3017D017}"/>
+                <a16:creationId xmlns:a16="http://schemas.microsoft.com/office/drawing/2014/main" id="{2F900FB4-732A-9C06-CE70-A8E5C391D3C2}"/>
               </a:ext>
             </a:extLst>
           </p:cNvPr>
@@ -10978,8 +11154,8 @@
         </p:blipFill>
         <p:spPr>
           <a:xfrm>
-            <a:off x="5775481" y="1492250"/>
-            <a:ext cx="3174740" cy="2957157"/>
+            <a:off x="3095743" y="1063651"/>
+            <a:ext cx="5143002" cy="3573033"/>
           </a:xfrm>
           <a:prstGeom prst="rect">
             <a:avLst/>
@@ -10988,45 +11164,48 @@
       </p:pic>
       <p:sp>
         <p:nvSpPr>
-          <p:cNvPr id="7" name="Rectángulo 6">
-            <a:extLst>
-              <a:ext uri="{FF2B5EF4-FFF2-40B4-BE49-F238E27FC236}">
-                <a16:creationId xmlns:a16="http://schemas.microsoft.com/office/drawing/2014/main" id="{D5C966C6-9599-496F-86F2-29990032E3F4}"/>
-              </a:ext>
-            </a:extLst>
-          </p:cNvPr>
-          <p:cNvSpPr/>
+          <p:cNvPr id="7" name="CuadroTexto 6">
+            <a:extLst>
+              <a:ext uri="{FF2B5EF4-FFF2-40B4-BE49-F238E27FC236}">
+                <a16:creationId xmlns:a16="http://schemas.microsoft.com/office/drawing/2014/main" id="{8E79C440-E022-A607-E89F-F4DD2B722AB1}"/>
+              </a:ext>
+            </a:extLst>
+          </p:cNvPr>
+          <p:cNvSpPr txBox="1"/>
           <p:nvPr/>
         </p:nvSpPr>
         <p:spPr>
           <a:xfrm>
-            <a:off x="2411761" y="4780416"/>
-            <a:ext cx="4119743" cy="248209"/>
+            <a:off x="4078224" y="4754880"/>
+            <a:ext cx="1865376" cy="300082"/>
           </a:xfrm>
           <a:prstGeom prst="rect">
             <a:avLst/>
           </a:prstGeom>
-        </p:spPr>
-        <p:txBody>
-          <a:bodyPr wrap="square">
+          <a:noFill/>
+        </p:spPr>
+        <p:txBody>
+          <a:bodyPr wrap="square" rtlCol="0">
             <a:spAutoFit/>
           </a:bodyPr>
           <a:lstStyle/>
           <a:p>
             <a:r>
-              <a:rPr lang="es-ES" sz="1013" dirty="0">
-                <a:hlinkClick r:id="rId4"/>
-              </a:rPr>
-              <a:t>https://matplotlib.org/api/animation_api.html</a:t>
-            </a:r>
-            <a:endParaRPr lang="es-ES" sz="1013" dirty="0"/>
+              <a:rPr lang="es-ES" dirty="0" err="1"/>
+              <a:t>Click</a:t>
+            </a:r>
+            <a:r>
+              <a:rPr lang="es-ES" dirty="0"/>
+              <a:t> en esta opción</a:t>
+            </a:r>
+            <a:endParaRPr lang="en-US" dirty="0"/>
           </a:p>
         </p:txBody>
       </p:sp>
     </p:spTree>
     <p:extLst>
       <p:ext uri="{BB962C8B-B14F-4D97-AF65-F5344CB8AC3E}">
-        <p14:creationId xmlns:p14="http://schemas.microsoft.com/office/powerpoint/2010/main" val="1507210675"/>
+        <p14:creationId xmlns:p14="http://schemas.microsoft.com/office/powerpoint/2010/main" val="753336865"/>
       </p:ext>
     </p:extLst>
   </p:cSld>
@@ -11266,7 +11445,7 @@
         </p:nvSpPr>
         <p:spPr>
           <a:xfrm>
-            <a:off x="1418095" y="369726"/>
+            <a:off x="1344612" y="474308"/>
             <a:ext cx="6454775" cy="541337"/>
           </a:xfrm>
         </p:spPr>
@@ -11276,7 +11455,7 @@
           <a:p>
             <a:r>
               <a:rPr lang="es-ES" dirty="0"/>
-              <a:t>La tortuga</a:t>
+              <a:t>Gráficos</a:t>
             </a:r>
           </a:p>
         </p:txBody>
@@ -11295,8 +11474,8 @@
         </p:nvSpPr>
         <p:spPr>
           <a:xfrm>
-            <a:off x="1499632" y="1321780"/>
-            <a:ext cx="7210415" cy="830997"/>
+            <a:off x="1780125" y="1362496"/>
+            <a:ext cx="7775355" cy="276999"/>
           </a:xfrm>
           <a:prstGeom prst="rect">
             <a:avLst/>
@@ -11312,26 +11491,7 @@
             <a:pPr algn="just"/>
             <a:r>
               <a:rPr lang="es-ES" sz="1200" dirty="0"/>
-              <a:t>La tortuga nació de una idea para enseñar a programar a niños, con un lenguaje que se llamaba PROLOG. Es una flecha que se mueve por la pantalla gráfica según las órdenes que recibe, del tipo “avanza”, “gira”, </a:t>
-            </a:r>
-            <a:r>
-              <a:rPr lang="es-ES" sz="1200" dirty="0" err="1"/>
-              <a:t>etc</a:t>
-            </a:r>
-            <a:r>
-              <a:rPr lang="es-ES" sz="1200" dirty="0"/>
-              <a:t>…</a:t>
-            </a:r>
-          </a:p>
-          <a:p>
-            <a:pPr algn="just"/>
-            <a:endParaRPr lang="es-ES" sz="1200" dirty="0"/>
-          </a:p>
-          <a:p>
-            <a:pPr algn="just"/>
-            <a:r>
-              <a:rPr lang="es-ES" sz="1200" dirty="0"/>
-              <a:t>Hay una adaptación magnífica en Python que nos va a servir para construir nuestro primer gran videojuego</a:t>
+              <a:t> ¿Recuerdas  las fórmulas de la recta, la parábola o la circunferencia que viste en matemáticas?</a:t>
             </a:r>
           </a:p>
         </p:txBody>
@@ -11350,8 +11510,8 @@
         </p:nvSpPr>
         <p:spPr>
           <a:xfrm>
-            <a:off x="1924569" y="3221177"/>
-            <a:ext cx="2273379" cy="248209"/>
+            <a:off x="4310336" y="4733200"/>
+            <a:ext cx="2119491" cy="248209"/>
           </a:xfrm>
           <a:prstGeom prst="rect">
             <a:avLst/>
@@ -11365,51 +11525,13 @@
           <a:p>
             <a:r>
               <a:rPr lang="es-ES" sz="1013" dirty="0"/>
-              <a:t>Abre </a:t>
+              <a:t>Abre los ficheros </a:t>
             </a:r>
             <a:r>
               <a:rPr lang="es-ES" sz="1013" dirty="0">
                 <a:latin typeface="Lucida Console" panose="020B0609040504020204" pitchFamily="49" charset="0"/>
               </a:rPr>
-              <a:t>tortuga_1_movimiento.py</a:t>
-            </a:r>
-            <a:endParaRPr lang="es-ES" sz="1013" dirty="0"/>
-          </a:p>
-        </p:txBody>
-      </p:sp>
-      <p:sp>
-        <p:nvSpPr>
-          <p:cNvPr id="8" name="CuadroTexto 7">
-            <a:extLst>
-              <a:ext uri="{FF2B5EF4-FFF2-40B4-BE49-F238E27FC236}">
-                <a16:creationId xmlns:a16="http://schemas.microsoft.com/office/drawing/2014/main" id="{7555D563-4F2A-4D84-A44B-F073878B1730}"/>
-              </a:ext>
-            </a:extLst>
-          </p:cNvPr>
-          <p:cNvSpPr txBox="1"/>
-          <p:nvPr/>
-        </p:nvSpPr>
-        <p:spPr>
-          <a:xfrm>
-            <a:off x="1304637" y="4785996"/>
-            <a:ext cx="2683748" cy="248209"/>
-          </a:xfrm>
-          <a:prstGeom prst="rect">
-            <a:avLst/>
-          </a:prstGeom>
-          <a:noFill/>
-        </p:spPr>
-        <p:txBody>
-          <a:bodyPr wrap="none" rtlCol="0">
-            <a:spAutoFit/>
-          </a:bodyPr>
-          <a:lstStyle/>
-          <a:p>
-            <a:r>
-              <a:rPr lang="es-ES" sz="1013" dirty="0">
-                <a:hlinkClick r:id="rId3"/>
-              </a:rPr>
-              <a:t>https://docs.python.org/3.6/library/turtle.html</a:t>
+              <a:t>pinta_.....py</a:t>
             </a:r>
             <a:endParaRPr lang="es-ES" sz="1013" dirty="0"/>
           </a:p>
@@ -11417,10 +11539,10 @@
       </p:sp>
       <p:pic>
         <p:nvPicPr>
-          <p:cNvPr id="9" name="Imagen 8">
-            <a:extLst>
-              <a:ext uri="{FF2B5EF4-FFF2-40B4-BE49-F238E27FC236}">
-                <a16:creationId xmlns:a16="http://schemas.microsoft.com/office/drawing/2014/main" id="{8CA5374F-5614-432C-846A-12941E406F82}"/>
+          <p:cNvPr id="2" name="Imagen 1">
+            <a:extLst>
+              <a:ext uri="{FF2B5EF4-FFF2-40B4-BE49-F238E27FC236}">
+                <a16:creationId xmlns:a16="http://schemas.microsoft.com/office/drawing/2014/main" id="{4B7514D5-E3D3-4236-B4E5-D0D578F341A2}"/>
               </a:ext>
             </a:extLst>
           </p:cNvPr>
@@ -11430,15 +11552,15 @@
           <p:nvPr/>
         </p:nvPicPr>
         <p:blipFill>
-          <a:blip r:embed="rId4"/>
+          <a:blip r:embed="rId3"/>
           <a:stretch>
             <a:fillRect/>
           </a:stretch>
         </p:blipFill>
         <p:spPr>
           <a:xfrm>
-            <a:off x="5199067" y="2526132"/>
-            <a:ext cx="2683748" cy="2393613"/>
+            <a:off x="3493007" y="1738141"/>
+            <a:ext cx="3754151" cy="2798880"/>
           </a:xfrm>
           <a:prstGeom prst="rect">
             <a:avLst/>
@@ -11448,7 +11570,7 @@
     </p:spTree>
     <p:extLst>
       <p:ext uri="{BB962C8B-B14F-4D97-AF65-F5344CB8AC3E}">
-        <p14:creationId xmlns:p14="http://schemas.microsoft.com/office/powerpoint/2010/main" val="2298596718"/>
+        <p14:creationId xmlns:p14="http://schemas.microsoft.com/office/powerpoint/2010/main" val="1688115370"/>
       </p:ext>
     </p:extLst>
   </p:cSld>
@@ -11493,7 +11615,7 @@
         </p:nvSpPr>
         <p:spPr>
           <a:xfrm>
-            <a:off x="1441343" y="416221"/>
+            <a:off x="1344612" y="414680"/>
             <a:ext cx="6454775" cy="541337"/>
           </a:xfrm>
         </p:spPr>
@@ -11503,17 +11625,58 @@
           <a:p>
             <a:r>
               <a:rPr lang="es-ES" dirty="0"/>
-              <a:t>Que te pillo</a:t>
-            </a:r>
-          </a:p>
-        </p:txBody>
-      </p:sp>
-      <p:sp>
-        <p:nvSpPr>
-          <p:cNvPr id="5" name="CuadroTexto 4">
-            <a:extLst>
-              <a:ext uri="{FF2B5EF4-FFF2-40B4-BE49-F238E27FC236}">
-                <a16:creationId xmlns:a16="http://schemas.microsoft.com/office/drawing/2014/main" id="{B93E3719-8EF1-43EA-8219-974FD6AF3B75}"/>
+              <a:t>Gráficos</a:t>
+            </a:r>
+          </a:p>
+        </p:txBody>
+      </p:sp>
+      <p:sp>
+        <p:nvSpPr>
+          <p:cNvPr id="10" name="Rectángulo 9">
+            <a:extLst>
+              <a:ext uri="{FF2B5EF4-FFF2-40B4-BE49-F238E27FC236}">
+                <a16:creationId xmlns:a16="http://schemas.microsoft.com/office/drawing/2014/main" id="{6B1CDEA1-CC90-40DE-99A0-727A817C58CD}"/>
+              </a:ext>
+            </a:extLst>
+          </p:cNvPr>
+          <p:cNvSpPr/>
+          <p:nvPr/>
+        </p:nvSpPr>
+        <p:spPr>
+          <a:xfrm>
+            <a:off x="2861766" y="4785996"/>
+            <a:ext cx="2141933" cy="248209"/>
+          </a:xfrm>
+          <a:prstGeom prst="rect">
+            <a:avLst/>
+          </a:prstGeom>
+        </p:spPr>
+        <p:txBody>
+          <a:bodyPr wrap="none">
+            <a:spAutoFit/>
+          </a:bodyPr>
+          <a:lstStyle/>
+          <a:p>
+            <a:r>
+              <a:rPr lang="es-ES" sz="1013" dirty="0"/>
+              <a:t>Abre el ficheros </a:t>
+            </a:r>
+            <a:r>
+              <a:rPr lang="es-ES" sz="1013" dirty="0">
+                <a:latin typeface="Lucida Console" panose="020B0609040504020204" pitchFamily="49" charset="0"/>
+              </a:rPr>
+              <a:t>onda_magica.py</a:t>
+            </a:r>
+            <a:endParaRPr lang="es-ES" sz="1013" dirty="0"/>
+          </a:p>
+        </p:txBody>
+      </p:sp>
+      <p:sp>
+        <p:nvSpPr>
+          <p:cNvPr id="6" name="CuadroTexto 5">
+            <a:extLst>
+              <a:ext uri="{FF2B5EF4-FFF2-40B4-BE49-F238E27FC236}">
+                <a16:creationId xmlns:a16="http://schemas.microsoft.com/office/drawing/2014/main" id="{FEF2BB80-0981-414A-95A8-32C9236895B9}"/>
               </a:ext>
             </a:extLst>
           </p:cNvPr>
@@ -11522,8 +11685,8 @@
         </p:nvSpPr>
         <p:spPr>
           <a:xfrm>
-            <a:off x="1495877" y="1266428"/>
-            <a:ext cx="6345705" cy="600164"/>
+            <a:off x="1331641" y="1761660"/>
+            <a:ext cx="5138902" cy="830997"/>
           </a:xfrm>
           <a:prstGeom prst="rect">
             <a:avLst/>
@@ -11538,34 +11701,26 @@
           <a:p>
             <a:pPr algn="just"/>
             <a:r>
-              <a:rPr lang="es-ES" sz="1100" dirty="0"/>
-              <a:t>¡Ya estamos preparados para desarrollar nuestro primer videojuego! La tortuga cazadora tiene que atrapar a una veloz presa que se mueve al azar. Gana quien lo consiga en menos tiempo. Abre el fichero </a:t>
-            </a:r>
-            <a:r>
-              <a:rPr lang="es-ES" sz="1100" dirty="0">
-                <a:solidFill>
-                  <a:schemeClr val="tx1">
-                    <a:lumMod val="50000"/>
-                    <a:lumOff val="50000"/>
-                  </a:schemeClr>
-                </a:solidFill>
-                <a:latin typeface="Lucida Sans Typewriter" panose="020B0509030504030204" pitchFamily="49" charset="0"/>
-              </a:rPr>
-              <a:t>quetepillo.py </a:t>
-            </a:r>
-            <a:r>
-              <a:rPr lang="es-ES" sz="1100" dirty="0"/>
-              <a:t>con las instrucciones detalladas. </a:t>
+              <a:rPr lang="es-ES" sz="1200" dirty="0"/>
+              <a:t>Un matemático francés del siglo XIX descubrió que cualquier forma de onda puede conseguirse sumando funciones </a:t>
+            </a:r>
+            <a:r>
+              <a:rPr lang="es-ES" sz="1200" dirty="0" err="1"/>
+              <a:t>sen</a:t>
+            </a:r>
+            <a:r>
+              <a:rPr lang="es-ES" sz="1200" dirty="0"/>
+              <a:t>(x). Esto te puede parecer extraño e incluso aburrido, pero es la base del funcionamiento de los ficheros de audio y video digitales. Vamos a comprobar si es cierto…</a:t>
             </a:r>
           </a:p>
         </p:txBody>
       </p:sp>
       <p:pic>
         <p:nvPicPr>
-          <p:cNvPr id="2" name="Imagen 1">
-            <a:extLst>
-              <a:ext uri="{FF2B5EF4-FFF2-40B4-BE49-F238E27FC236}">
-                <a16:creationId xmlns:a16="http://schemas.microsoft.com/office/drawing/2014/main" id="{65403036-1A17-40D0-9A9A-B2345990D191}"/>
+          <p:cNvPr id="8" name="Imagen 7">
+            <a:extLst>
+              <a:ext uri="{FF2B5EF4-FFF2-40B4-BE49-F238E27FC236}">
+                <a16:creationId xmlns:a16="http://schemas.microsoft.com/office/drawing/2014/main" id="{91582500-B07C-4697-A3BB-9CC228465D85}"/>
               </a:ext>
             </a:extLst>
           </p:cNvPr>
@@ -11575,25 +11730,76 @@
           <p:nvPr/>
         </p:nvPicPr>
         <p:blipFill>
-          <a:blip r:embed="rId3"/>
+          <a:blip r:embed="rId3">
+            <a:clrChange>
+              <a:clrFrom>
+                <a:srgbClr val="FFFFFF"/>
+              </a:clrFrom>
+              <a:clrTo>
+                <a:srgbClr val="FFFFFF">
+                  <a:alpha val="0"/>
+                </a:srgbClr>
+              </a:clrTo>
+            </a:clrChange>
+            <a:extLst>
+              <a:ext uri="{28A0092B-C50C-407E-A947-70E740481C1C}">
+                <a14:useLocalDpi xmlns:a14="http://schemas.microsoft.com/office/drawing/2010/main" val="0"/>
+              </a:ext>
+            </a:extLst>
+          </a:blip>
           <a:stretch>
             <a:fillRect/>
           </a:stretch>
         </p:blipFill>
         <p:spPr>
           <a:xfrm>
-            <a:off x="2638463" y="2303858"/>
-            <a:ext cx="4380497" cy="2511652"/>
+            <a:off x="6613853" y="1694173"/>
+            <a:ext cx="1885950" cy="2128838"/>
           </a:xfrm>
           <a:prstGeom prst="rect">
             <a:avLst/>
           </a:prstGeom>
         </p:spPr>
       </p:pic>
+      <p:sp>
+        <p:nvSpPr>
+          <p:cNvPr id="9" name="CuadroTexto 8">
+            <a:extLst>
+              <a:ext uri="{FF2B5EF4-FFF2-40B4-BE49-F238E27FC236}">
+                <a16:creationId xmlns:a16="http://schemas.microsoft.com/office/drawing/2014/main" id="{8F524D98-CDD0-4262-A75F-88EAE5CC4A80}"/>
+              </a:ext>
+            </a:extLst>
+          </p:cNvPr>
+          <p:cNvSpPr txBox="1"/>
+          <p:nvPr/>
+        </p:nvSpPr>
+        <p:spPr>
+          <a:xfrm>
+            <a:off x="6613853" y="4122664"/>
+            <a:ext cx="1633781" cy="248209"/>
+          </a:xfrm>
+          <a:prstGeom prst="rect">
+            <a:avLst/>
+          </a:prstGeom>
+          <a:noFill/>
+        </p:spPr>
+        <p:txBody>
+          <a:bodyPr wrap="none" rtlCol="0">
+            <a:spAutoFit/>
+          </a:bodyPr>
+          <a:lstStyle/>
+          <a:p>
+            <a:r>
+              <a:rPr lang="es-ES" sz="1013" dirty="0"/>
+              <a:t>Joseph Fourier (1768-1830)</a:t>
+            </a:r>
+          </a:p>
+        </p:txBody>
+      </p:sp>
     </p:spTree>
     <p:extLst>
       <p:ext uri="{BB962C8B-B14F-4D97-AF65-F5344CB8AC3E}">
-        <p14:creationId xmlns:p14="http://schemas.microsoft.com/office/powerpoint/2010/main" val="3560181772"/>
+        <p14:creationId xmlns:p14="http://schemas.microsoft.com/office/powerpoint/2010/main" val="4238457856"/>
       </p:ext>
     </p:extLst>
   </p:cSld>
@@ -11638,6 +11844,604 @@
         </p:nvSpPr>
         <p:spPr>
           <a:xfrm>
+            <a:off x="1344612" y="305391"/>
+            <a:ext cx="6454775" cy="541337"/>
+          </a:xfrm>
+        </p:spPr>
+        <p:txBody>
+          <a:bodyPr/>
+          <a:lstStyle/>
+          <a:p>
+            <a:r>
+              <a:rPr lang="es-ES" dirty="0"/>
+              <a:t>Animación</a:t>
+            </a:r>
+          </a:p>
+        </p:txBody>
+      </p:sp>
+      <p:sp>
+        <p:nvSpPr>
+          <p:cNvPr id="5" name="CuadroTexto 4">
+            <a:extLst>
+              <a:ext uri="{FF2B5EF4-FFF2-40B4-BE49-F238E27FC236}">
+                <a16:creationId xmlns:a16="http://schemas.microsoft.com/office/drawing/2014/main" id="{B93E3719-8EF1-43EA-8219-974FD6AF3B75}"/>
+              </a:ext>
+            </a:extLst>
+          </p:cNvPr>
+          <p:cNvSpPr txBox="1"/>
+          <p:nvPr/>
+        </p:nvSpPr>
+        <p:spPr>
+          <a:xfrm>
+            <a:off x="1950862" y="1492250"/>
+            <a:ext cx="2835315" cy="1200329"/>
+          </a:xfrm>
+          <a:prstGeom prst="rect">
+            <a:avLst/>
+          </a:prstGeom>
+          <a:noFill/>
+        </p:spPr>
+        <p:txBody>
+          <a:bodyPr wrap="square" rtlCol="0">
+            <a:spAutoFit/>
+          </a:bodyPr>
+          <a:lstStyle/>
+          <a:p>
+            <a:pPr algn="just"/>
+            <a:r>
+              <a:rPr lang="es-ES" sz="1200" dirty="0"/>
+              <a:t>Los gráficos estáticos son interesantes pero, ¡resultan mucho más divertidos los animados!.</a:t>
+            </a:r>
+          </a:p>
+          <a:p>
+            <a:pPr algn="just"/>
+            <a:endParaRPr lang="es-ES" sz="1200" dirty="0"/>
+          </a:p>
+          <a:p>
+            <a:pPr algn="just"/>
+            <a:r>
+              <a:rPr lang="es-ES" sz="1200" dirty="0"/>
+              <a:t>Eso lo podemos conseguir con las funciones de animación de </a:t>
+            </a:r>
+            <a:r>
+              <a:rPr lang="es-ES" sz="1200" dirty="0" err="1"/>
+              <a:t>matplotlib</a:t>
+            </a:r>
+            <a:r>
+              <a:rPr lang="es-ES" sz="1200" dirty="0"/>
+              <a:t>.</a:t>
+            </a:r>
+          </a:p>
+        </p:txBody>
+      </p:sp>
+      <p:sp>
+        <p:nvSpPr>
+          <p:cNvPr id="10" name="Rectángulo 9">
+            <a:extLst>
+              <a:ext uri="{FF2B5EF4-FFF2-40B4-BE49-F238E27FC236}">
+                <a16:creationId xmlns:a16="http://schemas.microsoft.com/office/drawing/2014/main" id="{6B1CDEA1-CC90-40DE-99A0-727A817C58CD}"/>
+              </a:ext>
+            </a:extLst>
+          </p:cNvPr>
+          <p:cNvSpPr/>
+          <p:nvPr/>
+        </p:nvSpPr>
+        <p:spPr>
+          <a:xfrm>
+            <a:off x="2858222" y="3784558"/>
+            <a:ext cx="1409360" cy="248209"/>
+          </a:xfrm>
+          <a:prstGeom prst="rect">
+            <a:avLst/>
+          </a:prstGeom>
+        </p:spPr>
+        <p:txBody>
+          <a:bodyPr wrap="none">
+            <a:spAutoFit/>
+          </a:bodyPr>
+          <a:lstStyle/>
+          <a:p>
+            <a:r>
+              <a:rPr lang="es-ES" sz="1013" dirty="0"/>
+              <a:t>Abre </a:t>
+            </a:r>
+            <a:r>
+              <a:rPr lang="es-ES" sz="1013" dirty="0">
+                <a:latin typeface="Lucida Console" panose="020B0609040504020204" pitchFamily="49" charset="0"/>
+              </a:rPr>
+              <a:t>animacion.py</a:t>
+            </a:r>
+            <a:endParaRPr lang="es-ES" sz="1013" dirty="0"/>
+          </a:p>
+        </p:txBody>
+      </p:sp>
+      <p:pic>
+        <p:nvPicPr>
+          <p:cNvPr id="6" name="Imagen 5">
+            <a:extLst>
+              <a:ext uri="{FF2B5EF4-FFF2-40B4-BE49-F238E27FC236}">
+                <a16:creationId xmlns:a16="http://schemas.microsoft.com/office/drawing/2014/main" id="{9BF54C30-1690-40A2-AA8B-BA1E3017D017}"/>
+              </a:ext>
+            </a:extLst>
+          </p:cNvPr>
+          <p:cNvPicPr>
+            <a:picLocks noChangeAspect="1"/>
+          </p:cNvPicPr>
+          <p:nvPr/>
+        </p:nvPicPr>
+        <p:blipFill>
+          <a:blip r:embed="rId3"/>
+          <a:stretch>
+            <a:fillRect/>
+          </a:stretch>
+        </p:blipFill>
+        <p:spPr>
+          <a:xfrm>
+            <a:off x="5775481" y="1492250"/>
+            <a:ext cx="3174740" cy="2957157"/>
+          </a:xfrm>
+          <a:prstGeom prst="rect">
+            <a:avLst/>
+          </a:prstGeom>
+        </p:spPr>
+      </p:pic>
+      <p:sp>
+        <p:nvSpPr>
+          <p:cNvPr id="7" name="Rectángulo 6">
+            <a:extLst>
+              <a:ext uri="{FF2B5EF4-FFF2-40B4-BE49-F238E27FC236}">
+                <a16:creationId xmlns:a16="http://schemas.microsoft.com/office/drawing/2014/main" id="{D5C966C6-9599-496F-86F2-29990032E3F4}"/>
+              </a:ext>
+            </a:extLst>
+          </p:cNvPr>
+          <p:cNvSpPr/>
+          <p:nvPr/>
+        </p:nvSpPr>
+        <p:spPr>
+          <a:xfrm>
+            <a:off x="2411761" y="4780416"/>
+            <a:ext cx="4119743" cy="248209"/>
+          </a:xfrm>
+          <a:prstGeom prst="rect">
+            <a:avLst/>
+          </a:prstGeom>
+        </p:spPr>
+        <p:txBody>
+          <a:bodyPr wrap="square">
+            <a:spAutoFit/>
+          </a:bodyPr>
+          <a:lstStyle/>
+          <a:p>
+            <a:r>
+              <a:rPr lang="es-ES" sz="1013" dirty="0">
+                <a:hlinkClick r:id="rId4"/>
+              </a:rPr>
+              <a:t>https://matplotlib.org/api/animation_api.html</a:t>
+            </a:r>
+            <a:endParaRPr lang="es-ES" sz="1013" dirty="0"/>
+          </a:p>
+        </p:txBody>
+      </p:sp>
+    </p:spTree>
+    <p:extLst>
+      <p:ext uri="{BB962C8B-B14F-4D97-AF65-F5344CB8AC3E}">
+        <p14:creationId xmlns:p14="http://schemas.microsoft.com/office/powerpoint/2010/main" val="1507210675"/>
+      </p:ext>
+    </p:extLst>
+  </p:cSld>
+  <p:clrMapOvr>
+    <a:masterClrMapping/>
+  </p:clrMapOvr>
+</p:sld>
+</file>
+
+<file path=ppt/slides/slide33.xml><?xml version="1.0" encoding="utf-8"?>
+<p:sld xmlns:a="http://schemas.openxmlformats.org/drawingml/2006/main" xmlns:r="http://schemas.openxmlformats.org/officeDocument/2006/relationships" xmlns:p="http://schemas.openxmlformats.org/presentationml/2006/main">
+  <p:cSld>
+    <p:spTree>
+      <p:nvGrpSpPr>
+        <p:cNvPr id="1" name=""/>
+        <p:cNvGrpSpPr/>
+        <p:nvPr/>
+      </p:nvGrpSpPr>
+      <p:grpSpPr>
+        <a:xfrm>
+          <a:off x="0" y="0"/>
+          <a:ext cx="0" cy="0"/>
+          <a:chOff x="0" y="0"/>
+          <a:chExt cx="0" cy="0"/>
+        </a:xfrm>
+      </p:grpSpPr>
+      <p:sp>
+        <p:nvSpPr>
+          <p:cNvPr id="4" name="Título 3">
+            <a:extLst>
+              <a:ext uri="{FF2B5EF4-FFF2-40B4-BE49-F238E27FC236}">
+                <a16:creationId xmlns:a16="http://schemas.microsoft.com/office/drawing/2014/main" id="{1447DB3E-0938-4A3E-AB67-1790D9702E3B}"/>
+              </a:ext>
+            </a:extLst>
+          </p:cNvPr>
+          <p:cNvSpPr>
+            <a:spLocks noGrp="1"/>
+          </p:cNvSpPr>
+          <p:nvPr>
+            <p:ph type="title" idx="4294967295"/>
+          </p:nvPr>
+        </p:nvSpPr>
+        <p:spPr>
+          <a:xfrm>
+            <a:off x="1418095" y="369726"/>
+            <a:ext cx="6454775" cy="541337"/>
+          </a:xfrm>
+        </p:spPr>
+        <p:txBody>
+          <a:bodyPr/>
+          <a:lstStyle/>
+          <a:p>
+            <a:r>
+              <a:rPr lang="es-ES" dirty="0"/>
+              <a:t>La tortuga</a:t>
+            </a:r>
+          </a:p>
+        </p:txBody>
+      </p:sp>
+      <p:sp>
+        <p:nvSpPr>
+          <p:cNvPr id="5" name="CuadroTexto 4">
+            <a:extLst>
+              <a:ext uri="{FF2B5EF4-FFF2-40B4-BE49-F238E27FC236}">
+                <a16:creationId xmlns:a16="http://schemas.microsoft.com/office/drawing/2014/main" id="{B93E3719-8EF1-43EA-8219-974FD6AF3B75}"/>
+              </a:ext>
+            </a:extLst>
+          </p:cNvPr>
+          <p:cNvSpPr txBox="1"/>
+          <p:nvPr/>
+        </p:nvSpPr>
+        <p:spPr>
+          <a:xfrm>
+            <a:off x="1499632" y="1321780"/>
+            <a:ext cx="7210415" cy="830997"/>
+          </a:xfrm>
+          <a:prstGeom prst="rect">
+            <a:avLst/>
+          </a:prstGeom>
+          <a:noFill/>
+        </p:spPr>
+        <p:txBody>
+          <a:bodyPr wrap="square" rtlCol="0">
+            <a:spAutoFit/>
+          </a:bodyPr>
+          <a:lstStyle/>
+          <a:p>
+            <a:pPr algn="just"/>
+            <a:r>
+              <a:rPr lang="es-ES" sz="1200" dirty="0"/>
+              <a:t>La tortuga nació de una idea para enseñar a programar a niños, con un lenguaje que se llamaba PROLOG. Es una flecha que se mueve por la pantalla gráfica según las órdenes que recibe, del tipo “avanza”, “gira”, </a:t>
+            </a:r>
+            <a:r>
+              <a:rPr lang="es-ES" sz="1200" dirty="0" err="1"/>
+              <a:t>etc</a:t>
+            </a:r>
+            <a:r>
+              <a:rPr lang="es-ES" sz="1200" dirty="0"/>
+              <a:t>…</a:t>
+            </a:r>
+          </a:p>
+          <a:p>
+            <a:pPr algn="just"/>
+            <a:endParaRPr lang="es-ES" sz="1200" dirty="0"/>
+          </a:p>
+          <a:p>
+            <a:pPr algn="just"/>
+            <a:r>
+              <a:rPr lang="es-ES" sz="1200" dirty="0"/>
+              <a:t>Hay una adaptación magnífica en Python que nos va a servir para construir nuestro primer gran videojuego</a:t>
+            </a:r>
+          </a:p>
+        </p:txBody>
+      </p:sp>
+      <p:sp>
+        <p:nvSpPr>
+          <p:cNvPr id="10" name="Rectángulo 9">
+            <a:extLst>
+              <a:ext uri="{FF2B5EF4-FFF2-40B4-BE49-F238E27FC236}">
+                <a16:creationId xmlns:a16="http://schemas.microsoft.com/office/drawing/2014/main" id="{6B1CDEA1-CC90-40DE-99A0-727A817C58CD}"/>
+              </a:ext>
+            </a:extLst>
+          </p:cNvPr>
+          <p:cNvSpPr/>
+          <p:nvPr/>
+        </p:nvSpPr>
+        <p:spPr>
+          <a:xfrm>
+            <a:off x="1924569" y="3221177"/>
+            <a:ext cx="2273379" cy="248209"/>
+          </a:xfrm>
+          <a:prstGeom prst="rect">
+            <a:avLst/>
+          </a:prstGeom>
+        </p:spPr>
+        <p:txBody>
+          <a:bodyPr wrap="none">
+            <a:spAutoFit/>
+          </a:bodyPr>
+          <a:lstStyle/>
+          <a:p>
+            <a:r>
+              <a:rPr lang="es-ES" sz="1013" dirty="0"/>
+              <a:t>Abre </a:t>
+            </a:r>
+            <a:r>
+              <a:rPr lang="es-ES" sz="1013" dirty="0">
+                <a:latin typeface="Lucida Console" panose="020B0609040504020204" pitchFamily="49" charset="0"/>
+              </a:rPr>
+              <a:t>tortuga_1_movimiento.py</a:t>
+            </a:r>
+            <a:endParaRPr lang="es-ES" sz="1013" dirty="0"/>
+          </a:p>
+        </p:txBody>
+      </p:sp>
+      <p:sp>
+        <p:nvSpPr>
+          <p:cNvPr id="8" name="CuadroTexto 7">
+            <a:extLst>
+              <a:ext uri="{FF2B5EF4-FFF2-40B4-BE49-F238E27FC236}">
+                <a16:creationId xmlns:a16="http://schemas.microsoft.com/office/drawing/2014/main" id="{7555D563-4F2A-4D84-A44B-F073878B1730}"/>
+              </a:ext>
+            </a:extLst>
+          </p:cNvPr>
+          <p:cNvSpPr txBox="1"/>
+          <p:nvPr/>
+        </p:nvSpPr>
+        <p:spPr>
+          <a:xfrm>
+            <a:off x="1304637" y="4785996"/>
+            <a:ext cx="2749471" cy="248209"/>
+          </a:xfrm>
+          <a:prstGeom prst="rect">
+            <a:avLst/>
+          </a:prstGeom>
+          <a:noFill/>
+        </p:spPr>
+        <p:txBody>
+          <a:bodyPr wrap="none" rtlCol="0">
+            <a:spAutoFit/>
+          </a:bodyPr>
+          <a:lstStyle/>
+          <a:p>
+            <a:r>
+              <a:rPr lang="es-ES" sz="1013" dirty="0">
+                <a:hlinkClick r:id="rId3"/>
+              </a:rPr>
+              <a:t>https://docs.python.org/3.10/library/turtle.html</a:t>
+            </a:r>
+            <a:endParaRPr lang="es-ES" sz="1013" dirty="0"/>
+          </a:p>
+        </p:txBody>
+      </p:sp>
+      <p:pic>
+        <p:nvPicPr>
+          <p:cNvPr id="9" name="Imagen 8">
+            <a:extLst>
+              <a:ext uri="{FF2B5EF4-FFF2-40B4-BE49-F238E27FC236}">
+                <a16:creationId xmlns:a16="http://schemas.microsoft.com/office/drawing/2014/main" id="{8CA5374F-5614-432C-846A-12941E406F82}"/>
+              </a:ext>
+            </a:extLst>
+          </p:cNvPr>
+          <p:cNvPicPr>
+            <a:picLocks noChangeAspect="1"/>
+          </p:cNvPicPr>
+          <p:nvPr/>
+        </p:nvPicPr>
+        <p:blipFill>
+          <a:blip r:embed="rId4"/>
+          <a:stretch>
+            <a:fillRect/>
+          </a:stretch>
+        </p:blipFill>
+        <p:spPr>
+          <a:xfrm>
+            <a:off x="5199067" y="2526132"/>
+            <a:ext cx="2683748" cy="2393613"/>
+          </a:xfrm>
+          <a:prstGeom prst="rect">
+            <a:avLst/>
+          </a:prstGeom>
+        </p:spPr>
+      </p:pic>
+    </p:spTree>
+    <p:extLst>
+      <p:ext uri="{BB962C8B-B14F-4D97-AF65-F5344CB8AC3E}">
+        <p14:creationId xmlns:p14="http://schemas.microsoft.com/office/powerpoint/2010/main" val="2298596718"/>
+      </p:ext>
+    </p:extLst>
+  </p:cSld>
+  <p:clrMapOvr>
+    <a:masterClrMapping/>
+  </p:clrMapOvr>
+</p:sld>
+</file>
+
+<file path=ppt/slides/slide34.xml><?xml version="1.0" encoding="utf-8"?>
+<p:sld xmlns:a="http://schemas.openxmlformats.org/drawingml/2006/main" xmlns:r="http://schemas.openxmlformats.org/officeDocument/2006/relationships" xmlns:p="http://schemas.openxmlformats.org/presentationml/2006/main">
+  <p:cSld>
+    <p:spTree>
+      <p:nvGrpSpPr>
+        <p:cNvPr id="1" name=""/>
+        <p:cNvGrpSpPr/>
+        <p:nvPr/>
+      </p:nvGrpSpPr>
+      <p:grpSpPr>
+        <a:xfrm>
+          <a:off x="0" y="0"/>
+          <a:ext cx="0" cy="0"/>
+          <a:chOff x="0" y="0"/>
+          <a:chExt cx="0" cy="0"/>
+        </a:xfrm>
+      </p:grpSpPr>
+      <p:sp>
+        <p:nvSpPr>
+          <p:cNvPr id="4" name="Título 3">
+            <a:extLst>
+              <a:ext uri="{FF2B5EF4-FFF2-40B4-BE49-F238E27FC236}">
+                <a16:creationId xmlns:a16="http://schemas.microsoft.com/office/drawing/2014/main" id="{1447DB3E-0938-4A3E-AB67-1790D9702E3B}"/>
+              </a:ext>
+            </a:extLst>
+          </p:cNvPr>
+          <p:cNvSpPr>
+            <a:spLocks noGrp="1"/>
+          </p:cNvSpPr>
+          <p:nvPr>
+            <p:ph type="title" idx="4294967295"/>
+          </p:nvPr>
+        </p:nvSpPr>
+        <p:spPr>
+          <a:xfrm>
+            <a:off x="1441343" y="416221"/>
+            <a:ext cx="6454775" cy="541337"/>
+          </a:xfrm>
+        </p:spPr>
+        <p:txBody>
+          <a:bodyPr/>
+          <a:lstStyle/>
+          <a:p>
+            <a:r>
+              <a:rPr lang="es-ES" dirty="0"/>
+              <a:t>Que te pillo</a:t>
+            </a:r>
+          </a:p>
+        </p:txBody>
+      </p:sp>
+      <p:sp>
+        <p:nvSpPr>
+          <p:cNvPr id="5" name="CuadroTexto 4">
+            <a:extLst>
+              <a:ext uri="{FF2B5EF4-FFF2-40B4-BE49-F238E27FC236}">
+                <a16:creationId xmlns:a16="http://schemas.microsoft.com/office/drawing/2014/main" id="{B93E3719-8EF1-43EA-8219-974FD6AF3B75}"/>
+              </a:ext>
+            </a:extLst>
+          </p:cNvPr>
+          <p:cNvSpPr txBox="1"/>
+          <p:nvPr/>
+        </p:nvSpPr>
+        <p:spPr>
+          <a:xfrm>
+            <a:off x="1495877" y="1266428"/>
+            <a:ext cx="6345705" cy="600164"/>
+          </a:xfrm>
+          <a:prstGeom prst="rect">
+            <a:avLst/>
+          </a:prstGeom>
+          <a:noFill/>
+        </p:spPr>
+        <p:txBody>
+          <a:bodyPr wrap="square" rtlCol="0">
+            <a:spAutoFit/>
+          </a:bodyPr>
+          <a:lstStyle/>
+          <a:p>
+            <a:pPr algn="just"/>
+            <a:r>
+              <a:rPr lang="es-ES" sz="1100" dirty="0"/>
+              <a:t>¡Ya estamos preparados para desarrollar nuestro primer videojuego! La tortuga cazadora tiene que atrapar a una veloz presa que se mueve al azar. Gana quien lo consiga en menos tiempo. Abre el fichero </a:t>
+            </a:r>
+            <a:r>
+              <a:rPr lang="es-ES" sz="1100" dirty="0">
+                <a:solidFill>
+                  <a:schemeClr val="tx1">
+                    <a:lumMod val="50000"/>
+                    <a:lumOff val="50000"/>
+                  </a:schemeClr>
+                </a:solidFill>
+                <a:latin typeface="Lucida Sans Typewriter" panose="020B0509030504030204" pitchFamily="49" charset="0"/>
+              </a:rPr>
+              <a:t>quetepillo.py </a:t>
+            </a:r>
+            <a:r>
+              <a:rPr lang="es-ES" sz="1100" dirty="0"/>
+              <a:t>con las instrucciones detalladas. </a:t>
+            </a:r>
+          </a:p>
+        </p:txBody>
+      </p:sp>
+      <p:pic>
+        <p:nvPicPr>
+          <p:cNvPr id="2" name="Imagen 1">
+            <a:extLst>
+              <a:ext uri="{FF2B5EF4-FFF2-40B4-BE49-F238E27FC236}">
+                <a16:creationId xmlns:a16="http://schemas.microsoft.com/office/drawing/2014/main" id="{65403036-1A17-40D0-9A9A-B2345990D191}"/>
+              </a:ext>
+            </a:extLst>
+          </p:cNvPr>
+          <p:cNvPicPr>
+            <a:picLocks noChangeAspect="1"/>
+          </p:cNvPicPr>
+          <p:nvPr/>
+        </p:nvPicPr>
+        <p:blipFill>
+          <a:blip r:embed="rId3"/>
+          <a:stretch>
+            <a:fillRect/>
+          </a:stretch>
+        </p:blipFill>
+        <p:spPr>
+          <a:xfrm>
+            <a:off x="2638463" y="2303858"/>
+            <a:ext cx="4380497" cy="2511652"/>
+          </a:xfrm>
+          <a:prstGeom prst="rect">
+            <a:avLst/>
+          </a:prstGeom>
+        </p:spPr>
+      </p:pic>
+    </p:spTree>
+    <p:extLst>
+      <p:ext uri="{BB962C8B-B14F-4D97-AF65-F5344CB8AC3E}">
+        <p14:creationId xmlns:p14="http://schemas.microsoft.com/office/powerpoint/2010/main" val="3560181772"/>
+      </p:ext>
+    </p:extLst>
+  </p:cSld>
+  <p:clrMapOvr>
+    <a:masterClrMapping/>
+  </p:clrMapOvr>
+</p:sld>
+</file>
+
+<file path=ppt/slides/slide35.xml><?xml version="1.0" encoding="utf-8"?>
+<p:sld xmlns:a="http://schemas.openxmlformats.org/drawingml/2006/main" xmlns:r="http://schemas.openxmlformats.org/officeDocument/2006/relationships" xmlns:p="http://schemas.openxmlformats.org/presentationml/2006/main">
+  <p:cSld>
+    <p:spTree>
+      <p:nvGrpSpPr>
+        <p:cNvPr id="1" name=""/>
+        <p:cNvGrpSpPr/>
+        <p:nvPr/>
+      </p:nvGrpSpPr>
+      <p:grpSpPr>
+        <a:xfrm>
+          <a:off x="0" y="0"/>
+          <a:ext cx="0" cy="0"/>
+          <a:chOff x="0" y="0"/>
+          <a:chExt cx="0" cy="0"/>
+        </a:xfrm>
+      </p:grpSpPr>
+      <p:sp>
+        <p:nvSpPr>
+          <p:cNvPr id="4" name="Título 3">
+            <a:extLst>
+              <a:ext uri="{FF2B5EF4-FFF2-40B4-BE49-F238E27FC236}">
+                <a16:creationId xmlns:a16="http://schemas.microsoft.com/office/drawing/2014/main" id="{1447DB3E-0938-4A3E-AB67-1790D9702E3B}"/>
+              </a:ext>
+            </a:extLst>
+          </p:cNvPr>
+          <p:cNvSpPr>
+            <a:spLocks noGrp="1"/>
+          </p:cNvSpPr>
+          <p:nvPr>
+            <p:ph type="title" idx="4294967295"/>
+          </p:nvPr>
+        </p:nvSpPr>
+        <p:spPr>
+          <a:xfrm>
             <a:off x="1534332" y="476159"/>
             <a:ext cx="6454775" cy="541337"/>
           </a:xfrm>
@@ -11805,7 +12609,7 @@
 </p:sld>
 </file>
 
-<file path=ppt/slides/slide33.xml><?xml version="1.0" encoding="utf-8"?>
+<file path=ppt/slides/slide36.xml><?xml version="1.0" encoding="utf-8"?>
 <p:sld xmlns:a="http://schemas.openxmlformats.org/drawingml/2006/main" xmlns:r="http://schemas.openxmlformats.org/officeDocument/2006/relationships" xmlns:p="http://schemas.openxmlformats.org/presentationml/2006/main">
   <p:cSld>
     <p:spTree>
@@ -14292,6 +15096,15 @@
 </file>
 
 <file path=customXml/item1.xml><?xml version="1.0" encoding="utf-8"?>
+<?mso-contentType ?>
+<FormTemplates xmlns="http://schemas.microsoft.com/sharepoint/v3/contenttype/forms">
+  <Display>DocumentLibraryForm</Display>
+  <Edit>DocumentLibraryForm</Edit>
+  <New>DocumentLibraryForm</New>
+</FormTemplates>
+</file>
+
+<file path=customXml/item2.xml><?xml version="1.0" encoding="utf-8"?>
 <ct:contentTypeSchema xmlns:ct="http://schemas.microsoft.com/office/2006/metadata/contentType" xmlns:ma="http://schemas.microsoft.com/office/2006/metadata/properties/metaAttributes" ct:_="" ma:_="" ma:contentTypeName="Documento" ma:contentTypeID="0x010100AE6A9B1AE3C694449E1CBECB26767C28" ma:contentTypeVersion="0" ma:contentTypeDescription="Crear nuevo documento." ma:contentTypeScope="" ma:versionID="f939733f7a29ff16f56243c74c11c85c">
   <xsd:schema xmlns:xsd="http://www.w3.org/2001/XMLSchema" xmlns:xs="http://www.w3.org/2001/XMLSchema" xmlns:p="http://schemas.microsoft.com/office/2006/metadata/properties" targetNamespace="http://schemas.microsoft.com/office/2006/metadata/properties" ma:root="true" ma:fieldsID="ebba8a198e9bb40c3eeca6d0bd41257a">
     <xsd:element name="properties">
@@ -14405,15 +15218,6 @@
 </ct:contentTypeSchema>
 </file>
 
-<file path=customXml/item2.xml><?xml version="1.0" encoding="utf-8"?>
-<?mso-contentType ?>
-<FormTemplates xmlns="http://schemas.microsoft.com/sharepoint/v3/contenttype/forms">
-  <Display>DocumentLibraryForm</Display>
-  <Edit>DocumentLibraryForm</Edit>
-  <New>DocumentLibraryForm</New>
-</FormTemplates>
-</file>
-
 <file path=customXml/item3.xml><?xml version="1.0" encoding="utf-8"?>
 <p:properties xmlns:p="http://schemas.microsoft.com/office/2006/metadata/properties" xmlns:xsi="http://www.w3.org/2001/XMLSchema-instance" xmlns:pc="http://schemas.microsoft.com/office/infopath/2007/PartnerControls">
   <documentManagement/>
@@ -14421,6 +15225,14 @@
 </file>
 
 <file path=customXml/itemProps1.xml><?xml version="1.0" encoding="utf-8"?>
+<ds:datastoreItem xmlns:ds="http://schemas.openxmlformats.org/officeDocument/2006/customXml" ds:itemID="{A9AB788B-E2DA-4E16-B351-E0EC0D46F47D}">
+  <ds:schemaRefs>
+    <ds:schemaRef ds:uri="http://schemas.microsoft.com/sharepoint/v3/contenttype/forms"/>
+  </ds:schemaRefs>
+</ds:datastoreItem>
+</file>
+
+<file path=customXml/itemProps2.xml><?xml version="1.0" encoding="utf-8"?>
 <ds:datastoreItem xmlns:ds="http://schemas.openxmlformats.org/officeDocument/2006/customXml" ds:itemID="{6FA80CCC-508F-47A8-A8E6-442477940EB7}">
   <ds:schemaRefs>
     <ds:schemaRef ds:uri="http://schemas.microsoft.com/office/2006/metadata/contentType"/>
@@ -14432,14 +15244,6 @@
     <ds:schemaRef ds:uri="http://purl.org/dc/terms/"/>
     <ds:schemaRef ds:uri="http://schemas.microsoft.com/internal/obd"/>
     <ds:schemaRef ds:uri="http://schemas.microsoft.com/office/infopath/2007/PartnerControls"/>
-  </ds:schemaRefs>
-</ds:datastoreItem>
-</file>
-
-<file path=customXml/itemProps2.xml><?xml version="1.0" encoding="utf-8"?>
-<ds:datastoreItem xmlns:ds="http://schemas.openxmlformats.org/officeDocument/2006/customXml" ds:itemID="{A9AB788B-E2DA-4E16-B351-E0EC0D46F47D}">
-  <ds:schemaRefs>
-    <ds:schemaRef ds:uri="http://schemas.microsoft.com/sharepoint/v3/contenttype/forms"/>
   </ds:schemaRefs>
 </ds:datastoreItem>
 </file>

</xml_diff>